<commit_message>
Simple Page Object example
</commit_message>
<xml_diff>
--- a/Selenium Java.pptx
+++ b/Selenium Java.pptx
@@ -110,6 +110,11 @@
       </a:defRPr>
     </a:lvl9pPr>
   </p:defaultTextStyle>
+  <p:extLst>
+    <p:ext uri="{EFAFB233-063F-42B5-8137-9DF3F51BA10A}">
+      <p15:sldGuideLst xmlns:p15="http://schemas.microsoft.com/office/powerpoint/2012/main"/>
+    </p:ext>
+  </p:extLst>
 </p:presentation>
 </file>
 
@@ -4229,53 +4234,6 @@
           </a:extLst>
         </p:spPr>
       </p:pic>
-      <p:pic>
-        <p:nvPicPr>
-          <p:cNvPr id="4104" name="Picture 8" descr="Locators in Selenium- WebElements in Selenium- Edureka">
-            <a:extLst>
-              <a:ext uri="{FF2B5EF4-FFF2-40B4-BE49-F238E27FC236}">
-                <a16:creationId xmlns:a16="http://schemas.microsoft.com/office/drawing/2014/main" id="{C1B61B0E-82DF-4FE5-AA51-FF557A8C7E31}"/>
-              </a:ext>
-            </a:extLst>
-          </p:cNvPr>
-          <p:cNvPicPr>
-            <a:picLocks noChangeAspect="1" noChangeArrowheads="1"/>
-          </p:cNvPicPr>
-          <p:nvPr/>
-        </p:nvPicPr>
-        <p:blipFill>
-          <a:blip r:embed="rId2">
-            <a:extLst>
-              <a:ext uri="{28A0092B-C50C-407E-A947-70E740481C1C}">
-                <a14:useLocalDpi xmlns:a14="http://schemas.microsoft.com/office/drawing/2010/main" val="0"/>
-              </a:ext>
-            </a:extLst>
-          </a:blip>
-          <a:srcRect/>
-          <a:stretch>
-            <a:fillRect/>
-          </a:stretch>
-        </p:blipFill>
-        <p:spPr bwMode="auto">
-          <a:xfrm>
-            <a:off x="4667250" y="2609850"/>
-            <a:ext cx="2857500" cy="1638300"/>
-          </a:xfrm>
-          <a:prstGeom prst="rect">
-            <a:avLst/>
-          </a:prstGeom>
-          <a:noFill/>
-          <a:extLst>
-            <a:ext uri="{909E8E84-426E-40DD-AFC4-6F175D3DCCD1}">
-              <a14:hiddenFill xmlns:a14="http://schemas.microsoft.com/office/drawing/2010/main">
-                <a:solidFill>
-                  <a:srgbClr val="FFFFFF"/>
-                </a:solidFill>
-              </a14:hiddenFill>
-            </a:ext>
-          </a:extLst>
-        </p:spPr>
-      </p:pic>
     </p:spTree>
     <p:extLst>
       <p:ext uri="{BB962C8B-B14F-4D97-AF65-F5344CB8AC3E}">

</xml_diff>